<commit_message>
Completed List and Profile
</commit_message>
<xml_diff>
--- a/Documentation/Smart trolley().pptx
+++ b/Documentation/Smart trolley().pptx
@@ -205,7 +205,7 @@
             <a:fld id="{C384628D-4B1A-4F68-851A-30ECF0C7A4D3}" type="datetimeFigureOut">
               <a:rPr lang="en-US" smtClean="0"/>
               <a:pPr/>
-              <a:t>8/9/2018</a:t>
+              <a:t>8/25/2018</a:t>
             </a:fld>
             <a:endParaRPr lang="en-US"/>
           </a:p>
@@ -806,7 +806,7 @@
     </p:spTree>
     <p:extLst>
       <p:ext uri="{BB962C8B-B14F-4D97-AF65-F5344CB8AC3E}">
-        <p14:creationId xmlns:p14="http://schemas.microsoft.com/office/powerpoint/2010/main" xmlns="" val="3388488985"/>
+        <p14:creationId xmlns="" xmlns:p14="http://schemas.microsoft.com/office/powerpoint/2010/main" val="3388488985"/>
       </p:ext>
     </p:extLst>
   </p:cSld>
@@ -1033,7 +1033,7 @@
             <a:fld id="{8026C799-CFAD-450F-8C0E-44BADDA73201}" type="datetimeFigureOut">
               <a:rPr lang="en-US" smtClean="0"/>
               <a:pPr/>
-              <a:t>8/9/2018</a:t>
+              <a:t>8/25/2018</a:t>
             </a:fld>
             <a:endParaRPr lang="en-IN"/>
           </a:p>
@@ -1348,7 +1348,7 @@
             <a:fld id="{8026C799-CFAD-450F-8C0E-44BADDA73201}" type="datetimeFigureOut">
               <a:rPr lang="en-US" smtClean="0"/>
               <a:pPr/>
-              <a:t>8/9/2018</a:t>
+              <a:t>8/25/2018</a:t>
             </a:fld>
             <a:endParaRPr lang="en-IN"/>
           </a:p>
@@ -1535,7 +1535,7 @@
             <a:fld id="{8026C799-CFAD-450F-8C0E-44BADDA73201}" type="datetimeFigureOut">
               <a:rPr lang="en-US" smtClean="0"/>
               <a:pPr/>
-              <a:t>8/9/2018</a:t>
+              <a:t>8/25/2018</a:t>
             </a:fld>
             <a:endParaRPr lang="en-IN"/>
           </a:p>
@@ -1712,7 +1712,7 @@
             <a:fld id="{8026C799-CFAD-450F-8C0E-44BADDA73201}" type="datetimeFigureOut">
               <a:rPr lang="en-US" smtClean="0"/>
               <a:pPr/>
-              <a:t>8/9/2018</a:t>
+              <a:t>8/25/2018</a:t>
             </a:fld>
             <a:endParaRPr lang="en-IN"/>
           </a:p>
@@ -1982,7 +1982,7 @@
             <a:fld id="{8026C799-CFAD-450F-8C0E-44BADDA73201}" type="datetimeFigureOut">
               <a:rPr lang="en-US" smtClean="0"/>
               <a:pPr/>
-              <a:t>8/9/2018</a:t>
+              <a:t>8/25/2018</a:t>
             </a:fld>
             <a:endParaRPr lang="en-IN"/>
           </a:p>
@@ -2452,7 +2452,7 @@
             <a:fld id="{8026C799-CFAD-450F-8C0E-44BADDA73201}" type="datetimeFigureOut">
               <a:rPr lang="en-US" smtClean="0"/>
               <a:pPr/>
-              <a:t>8/9/2018</a:t>
+              <a:t>8/25/2018</a:t>
             </a:fld>
             <a:endParaRPr lang="en-IN"/>
           </a:p>
@@ -2943,7 +2943,7 @@
             <a:fld id="{8026C799-CFAD-450F-8C0E-44BADDA73201}" type="datetimeFigureOut">
               <a:rPr lang="en-US" smtClean="0"/>
               <a:pPr/>
-              <a:t>8/9/2018</a:t>
+              <a:t>8/25/2018</a:t>
             </a:fld>
             <a:endParaRPr lang="en-IN"/>
           </a:p>
@@ -3071,7 +3071,7 @@
             <a:fld id="{8026C799-CFAD-450F-8C0E-44BADDA73201}" type="datetimeFigureOut">
               <a:rPr lang="en-US" smtClean="0"/>
               <a:pPr/>
-              <a:t>8/9/2018</a:t>
+              <a:t>8/25/2018</a:t>
             </a:fld>
             <a:endParaRPr lang="en-IN"/>
           </a:p>
@@ -3217,7 +3217,7 @@
             <a:fld id="{8026C799-CFAD-450F-8C0E-44BADDA73201}" type="datetimeFigureOut">
               <a:rPr lang="en-US" smtClean="0"/>
               <a:pPr/>
-              <a:t>8/9/2018</a:t>
+              <a:t>8/25/2018</a:t>
             </a:fld>
             <a:endParaRPr lang="en-IN"/>
           </a:p>
@@ -3541,7 +3541,7 @@
             <a:fld id="{8026C799-CFAD-450F-8C0E-44BADDA73201}" type="datetimeFigureOut">
               <a:rPr lang="en-US" smtClean="0"/>
               <a:pPr/>
-              <a:t>8/9/2018</a:t>
+              <a:t>8/25/2018</a:t>
             </a:fld>
             <a:endParaRPr lang="en-IN"/>
           </a:p>
@@ -3677,7 +3677,7 @@
             <a:fld id="{8026C799-CFAD-450F-8C0E-44BADDA73201}" type="datetimeFigureOut">
               <a:rPr lang="en-US" smtClean="0"/>
               <a:pPr/>
-              <a:t>8/9/2018</a:t>
+              <a:t>8/25/2018</a:t>
             </a:fld>
             <a:endParaRPr lang="en-IN"/>
           </a:p>
@@ -4460,7 +4460,7 @@
             <a:fld id="{8026C799-CFAD-450F-8C0E-44BADDA73201}" type="datetimeFigureOut">
               <a:rPr lang="en-US" smtClean="0"/>
               <a:pPr/>
-              <a:t>8/9/2018</a:t>
+              <a:t>8/25/2018</a:t>
             </a:fld>
             <a:endParaRPr lang="en-IN"/>
           </a:p>
@@ -5028,7 +5028,7 @@
               <a:t>on</a:t>
             </a:r>
             <a:r>
-              <a:rPr lang="en-US" sz="3000" b="1" dirty="0" smtClean="0">
+              <a:rPr lang="en-US" sz="3000" b="1" smtClean="0">
                 <a:solidFill>
                   <a:schemeClr val="accent4">
                     <a:lumMod val="50000"/>
@@ -5040,7 +5040,7 @@
               <a:t/>
             </a:r>
             <a:br>
-              <a:rPr lang="en-US" sz="3000" b="1" dirty="0" smtClean="0">
+              <a:rPr lang="en-US" sz="3000" b="1" smtClean="0">
                 <a:solidFill>
                   <a:schemeClr val="accent4">
                     <a:lumMod val="50000"/>
@@ -5051,6 +5051,16 @@
               </a:rPr>
             </a:br>
             <a:r>
+              <a:rPr lang="en-US" sz="3000" b="1" u="sng" smtClean="0">
+                <a:solidFill>
+                  <a:schemeClr val="tx2"/>
+                </a:solidFill>
+                <a:latin typeface="Times New Roman" pitchFamily="18" charset="0"/>
+                <a:cs typeface="Times New Roman" pitchFamily="18" charset="0"/>
+              </a:rPr>
+              <a:t>Intelligent </a:t>
+            </a:r>
+            <a:r>
               <a:rPr lang="en-US" sz="3000" b="1" u="sng" dirty="0" smtClean="0">
                 <a:solidFill>
                   <a:schemeClr val="tx2"/>
@@ -5058,7 +5068,7 @@
                 <a:latin typeface="Times New Roman" pitchFamily="18" charset="0"/>
                 <a:cs typeface="Times New Roman" pitchFamily="18" charset="0"/>
               </a:rPr>
-              <a:t>Intelligent Shopping basket</a:t>
+              <a:t>Shopping basket</a:t>
             </a:r>
             <a:r>
               <a:rPr lang="en-US" sz="2400" b="1" i="1" u="sng" dirty="0" smtClean="0">
@@ -5538,7 +5548,7 @@
     </p:spTree>
     <p:extLst>
       <p:ext uri="{BB962C8B-B14F-4D97-AF65-F5344CB8AC3E}">
-        <p14:creationId xmlns:p14="http://schemas.microsoft.com/office/powerpoint/2010/main" xmlns="" val="989790150"/>
+        <p14:creationId xmlns="" xmlns:p14="http://schemas.microsoft.com/office/powerpoint/2010/main" val="989790150"/>
       </p:ext>
     </p:extLst>
   </p:cSld>
@@ -7017,31 +7027,7 @@
             </a:r>
             <a:r>
               <a:rPr lang="en-US" sz="2000" dirty="0" smtClean="0"/>
-              <a:t> and Smart phone for developing a smart shopping system which automates the entire billing procedure. The system developed is highly reliable, fair and cost-effective. </a:t>
-            </a:r>
-            <a:r>
-              <a:rPr lang="en-US" sz="2000" dirty="0" smtClean="0"/>
-              <a:t>With this, shoppers no longer have to wait near counters for payment of </a:t>
-            </a:r>
-            <a:r>
-              <a:rPr lang="en-US" sz="2000" dirty="0" smtClean="0"/>
-              <a:t>bills because </a:t>
-            </a:r>
-            <a:r>
-              <a:rPr lang="en-US" sz="2000" dirty="0" smtClean="0"/>
-              <a:t>of their purchased item information getting transferred to central billing </a:t>
-            </a:r>
-            <a:r>
-              <a:rPr lang="en-US" sz="2000" dirty="0" smtClean="0"/>
-              <a:t>unit. </a:t>
-            </a:r>
-            <a:r>
-              <a:rPr lang="en-US" sz="2000" dirty="0" smtClean="0"/>
-              <a:t>This will enhance the shopping experience to a new level</a:t>
-            </a:r>
-            <a:r>
-              <a:rPr lang="en-US" sz="2000" dirty="0" smtClean="0"/>
-              <a:t>.</a:t>
+              <a:t> and Smart phone for developing a smart shopping system which automates the entire billing procedure. The system developed is highly reliable, fair and cost-effective. With this, shoppers no longer have to wait near counters for payment of bills because of their purchased item information getting transferred to central billing unit. This will enhance the shopping experience to a new level.</a:t>
             </a:r>
           </a:p>
           <a:p>
@@ -7050,13 +7036,8 @@
             </a:pPr>
             <a:r>
               <a:rPr lang="en-US" sz="2000" dirty="0" smtClean="0"/>
-              <a:t>		Taking </a:t>
-            </a:r>
-            <a:r>
-              <a:rPr lang="en-US" sz="2000" dirty="0" smtClean="0"/>
-              <a:t>into account the changing trend in retail shopping, we come to a conclusion that the Intelligent Shopping Basket is most certainly a definite necessity for the Retail marketing industry to step up their portfolios , cope up with the advancement in technology and save time and manpower. </a:t>
-            </a:r>
-            <a:endParaRPr lang="en-US" sz="2000" dirty="0" smtClean="0"/>
+              <a:t>		Taking into account the changing trend in retail shopping, we come to a conclusion that the Intelligent Shopping Basket is most certainly a definite necessity for the Retail marketing industry to step up their portfolios , cope up with the advancement in technology and save time and manpower. </a:t>
+            </a:r>
           </a:p>
           <a:p>
             <a:pPr algn="just"/>
@@ -7881,11 +7862,7 @@
             </a:pPr>
             <a:r>
               <a:rPr lang="en-US" sz="2400" dirty="0" smtClean="0"/>
-              <a:t>DETAILS OF HARDWARE AND </a:t>
-            </a:r>
-            <a:r>
-              <a:rPr lang="en-US" sz="2400" dirty="0" smtClean="0"/>
-              <a:t>SOFTWARE</a:t>
+              <a:t>DETAILS OF HARDWARE AND SOFTWARE</a:t>
             </a:r>
           </a:p>
           <a:p>
@@ -7897,7 +7874,6 @@
               <a:rPr lang="en-US" sz="2400" dirty="0" smtClean="0"/>
               <a:t>CONCLUSION</a:t>
             </a:r>
-            <a:endParaRPr lang="en-US" sz="2400" dirty="0" smtClean="0"/>
           </a:p>
           <a:p>
             <a:pPr>

</xml_diff>